<commit_message>
Presentation to english. Readme
</commit_message>
<xml_diff>
--- a/Documentation/project_slide.pptx
+++ b/Documentation/project_slide.pptx
@@ -767,7 +767,7 @@
           <a:p>
             <a:fld id="{4AAD347D-5ACD-4C99-B74B-A9C85AD731AF}" type="datetimeFigureOut">
               <a:rPr lang="en-US" smtClean="0"/>
-              <a:t>20-Oct-19</a:t>
+              <a:t>21-Oct-19</a:t>
             </a:fld>
             <a:endParaRPr lang="en-US" dirty="0"/>
           </a:p>
@@ -1887,7 +1887,7 @@
           <a:p>
             <a:fld id="{4509A250-FF31-4206-8172-F9D3106AACB1}" type="datetimeFigureOut">
               <a:rPr lang="en-US" smtClean="0"/>
-              <a:t>20-Oct-19</a:t>
+              <a:t>21-Oct-19</a:t>
             </a:fld>
             <a:endParaRPr lang="en-US" dirty="0"/>
           </a:p>
@@ -2898,7 +2898,7 @@
           <a:p>
             <a:fld id="{4509A250-FF31-4206-8172-F9D3106AACB1}" type="datetimeFigureOut">
               <a:rPr lang="en-US" smtClean="0"/>
-              <a:t>20-Oct-19</a:t>
+              <a:t>21-Oct-19</a:t>
             </a:fld>
             <a:endParaRPr lang="en-US" dirty="0"/>
           </a:p>
@@ -4068,7 +4068,7 @@
           <a:p>
             <a:fld id="{4509A250-FF31-4206-8172-F9D3106AACB1}" type="datetimeFigureOut">
               <a:rPr lang="en-US" smtClean="0"/>
-              <a:t>20-Oct-19</a:t>
+              <a:t>21-Oct-19</a:t>
             </a:fld>
             <a:endParaRPr lang="en-US" dirty="0"/>
           </a:p>
@@ -5129,7 +5129,7 @@
           <a:p>
             <a:fld id="{4509A250-FF31-4206-8172-F9D3106AACB1}" type="datetimeFigureOut">
               <a:rPr lang="en-US" smtClean="0"/>
-              <a:t>20-Oct-19</a:t>
+              <a:t>21-Oct-19</a:t>
             </a:fld>
             <a:endParaRPr lang="en-US" dirty="0"/>
           </a:p>
@@ -5775,7 +5775,7 @@
           <a:p>
             <a:fld id="{4509A250-FF31-4206-8172-F9D3106AACB1}" type="datetimeFigureOut">
               <a:rPr lang="en-US" smtClean="0"/>
-              <a:t>20-Oct-19</a:t>
+              <a:t>21-Oct-19</a:t>
             </a:fld>
             <a:endParaRPr lang="en-US" dirty="0"/>
           </a:p>
@@ -6622,7 +6622,7 @@
           <a:p>
             <a:fld id="{4509A250-FF31-4206-8172-F9D3106AACB1}" type="datetimeFigureOut">
               <a:rPr lang="en-US" smtClean="0"/>
-              <a:t>20-Oct-19</a:t>
+              <a:t>21-Oct-19</a:t>
             </a:fld>
             <a:endParaRPr lang="en-US" dirty="0"/>
           </a:p>
@@ -6797,7 +6797,7 @@
           <a:p>
             <a:fld id="{4509A250-FF31-4206-8172-F9D3106AACB1}" type="datetimeFigureOut">
               <a:rPr lang="en-US" smtClean="0"/>
-              <a:t>20-Oct-19</a:t>
+              <a:t>21-Oct-19</a:t>
             </a:fld>
             <a:endParaRPr lang="en-US" dirty="0"/>
           </a:p>
@@ -7795,7 +7795,7 @@
           <a:p>
             <a:fld id="{4509A250-FF31-4206-8172-F9D3106AACB1}" type="datetimeFigureOut">
               <a:rPr lang="en-US" smtClean="0"/>
-              <a:t>20-Oct-19</a:t>
+              <a:t>21-Oct-19</a:t>
             </a:fld>
             <a:endParaRPr lang="en-US" dirty="0"/>
           </a:p>
@@ -8001,7 +8001,7 @@
           <a:p>
             <a:fld id="{4509A250-FF31-4206-8172-F9D3106AACB1}" type="datetimeFigureOut">
               <a:rPr lang="en-US" smtClean="0"/>
-              <a:t>20-Oct-19</a:t>
+              <a:t>21-Oct-19</a:t>
             </a:fld>
             <a:endParaRPr lang="en-US" dirty="0"/>
           </a:p>
@@ -9063,7 +9063,7 @@
           <a:p>
             <a:fld id="{9796027F-7875-4030-9381-8BD8C4F21935}" type="datetimeFigureOut">
               <a:rPr lang="en-US" smtClean="0"/>
-              <a:t>20-Oct-19</a:t>
+              <a:t>21-Oct-19</a:t>
             </a:fld>
             <a:endParaRPr lang="en-US" dirty="0"/>
           </a:p>
@@ -9335,7 +9335,7 @@
           <a:p>
             <a:fld id="{9796027F-7875-4030-9381-8BD8C4F21935}" type="datetimeFigureOut">
               <a:rPr lang="en-US" smtClean="0"/>
-              <a:t>20-Oct-19</a:t>
+              <a:t>21-Oct-19</a:t>
             </a:fld>
             <a:endParaRPr lang="en-US" dirty="0"/>
           </a:p>
@@ -9717,7 +9717,7 @@
           <a:p>
             <a:fld id="{9796027F-7875-4030-9381-8BD8C4F21935}" type="datetimeFigureOut">
               <a:rPr lang="en-US" smtClean="0"/>
-              <a:t>20-Oct-19</a:t>
+              <a:t>21-Oct-19</a:t>
             </a:fld>
             <a:endParaRPr lang="en-US" dirty="0"/>
           </a:p>
@@ -9835,7 +9835,7 @@
           <a:p>
             <a:fld id="{4509A250-FF31-4206-8172-F9D3106AACB1}" type="datetimeFigureOut">
               <a:rPr lang="en-US" smtClean="0"/>
-              <a:t>20-Oct-19</a:t>
+              <a:t>21-Oct-19</a:t>
             </a:fld>
             <a:endParaRPr lang="en-US" dirty="0"/>
           </a:p>
@@ -9930,7 +9930,7 @@
           <a:p>
             <a:fld id="{4509A250-FF31-4206-8172-F9D3106AACB1}" type="datetimeFigureOut">
               <a:rPr lang="en-US" smtClean="0"/>
-              <a:t>20-Oct-19</a:t>
+              <a:t>21-Oct-19</a:t>
             </a:fld>
             <a:endParaRPr lang="en-US" dirty="0"/>
           </a:p>
@@ -11039,7 +11039,7 @@
           <a:p>
             <a:fld id="{4509A250-FF31-4206-8172-F9D3106AACB1}" type="datetimeFigureOut">
               <a:rPr lang="en-US" smtClean="0"/>
-              <a:t>20-Oct-19</a:t>
+              <a:t>21-Oct-19</a:t>
             </a:fld>
             <a:endParaRPr lang="en-US" dirty="0"/>
           </a:p>
@@ -12172,7 +12172,7 @@
           <a:p>
             <a:fld id="{4509A250-FF31-4206-8172-F9D3106AACB1}" type="datetimeFigureOut">
               <a:rPr lang="en-US" smtClean="0"/>
-              <a:t>20-Oct-19</a:t>
+              <a:t>21-Oct-19</a:t>
             </a:fld>
             <a:endParaRPr lang="en-US" dirty="0"/>
           </a:p>
@@ -13200,7 +13200,7 @@
           <a:p>
             <a:fld id="{4AAD347D-5ACD-4C99-B74B-A9C85AD731AF}" type="datetimeFigureOut">
               <a:rPr lang="en-US" smtClean="0"/>
-              <a:t>20-Oct-19</a:t>
+              <a:t>21-Oct-19</a:t>
             </a:fld>
             <a:endParaRPr lang="en-US" dirty="0"/>
           </a:p>
@@ -13801,8 +13801,20 @@
           <a:lstStyle/>
           <a:p>
             <a:r>
-              <a:rPr lang="es-ES" dirty="0" smtClean="0"/>
-              <a:t>Red de emergencia colaborativa</a:t>
+              <a:rPr lang="es-ES" dirty="0" err="1"/>
+              <a:t>Collaborative</a:t>
+            </a:r>
+            <a:r>
+              <a:rPr lang="es-ES" dirty="0"/>
+              <a:t> </a:t>
+            </a:r>
+            <a:r>
+              <a:rPr lang="es-ES" dirty="0" err="1"/>
+              <a:t>Emergency</a:t>
+            </a:r>
+            <a:r>
+              <a:rPr lang="es-ES" dirty="0"/>
+              <a:t> Network</a:t>
             </a:r>
             <a:endParaRPr lang="es-ES" dirty="0"/>
           </a:p>
@@ -13955,11 +13967,7 @@
             </a:r>
             <a:r>
               <a:rPr lang="en-US" dirty="0" err="1" smtClean="0"/>
-              <a:t>S</a:t>
-            </a:r>
-            <a:r>
-              <a:rPr lang="en-US" dirty="0" err="1" smtClean="0"/>
-              <a:t>paceApps</a:t>
+              <a:t>SpaceApps</a:t>
             </a:r>
             <a:r>
               <a:rPr lang="en-US" dirty="0" smtClean="0"/>
@@ -14094,35 +14102,24 @@
           <a:lstStyle/>
           <a:p>
             <a:r>
-              <a:rPr lang="en-US" sz="2200" b="1" dirty="0" err="1" smtClean="0"/>
-              <a:t>Reto</a:t>
-            </a:r>
-            <a:r>
               <a:rPr lang="en-US" sz="2200" dirty="0" smtClean="0"/>
-              <a:t> </a:t>
-            </a:r>
-            <a:r>
-              <a:rPr lang="en-US" sz="2200" dirty="0" err="1" smtClean="0"/>
-              <a:t>seleccionado</a:t>
+              <a:t>Chosen</a:t>
+            </a:r>
+            <a:r>
+              <a:rPr lang="en-US" sz="2200" b="1" dirty="0" smtClean="0"/>
+              <a:t> challenge</a:t>
             </a:r>
             <a:r>
               <a:rPr lang="en-US" sz="2200" dirty="0" smtClean="0"/>
               <a:t>:</a:t>
             </a:r>
+            <a:endParaRPr lang="en-US" sz="2200" dirty="0" smtClean="0"/>
           </a:p>
           <a:p>
             <a:pPr lvl="1"/>
             <a:r>
               <a:rPr lang="en-US" sz="2200" dirty="0" smtClean="0"/>
-              <a:t>From Curious Minds Come Helping </a:t>
-            </a:r>
-            <a:r>
-              <a:rPr lang="en-US" sz="2200" dirty="0" smtClean="0"/>
-              <a:t>Hands</a:t>
-            </a:r>
-            <a:r>
-              <a:rPr lang="en-US" sz="2200" dirty="0" smtClean="0"/>
-              <a:t/>
+              <a:t>From Curious Minds Come Helping Hands</a:t>
             </a:r>
             <a:br>
               <a:rPr lang="en-US" sz="2200" dirty="0" smtClean="0"/>
@@ -14132,66 +14129,23 @@
           <a:p>
             <a:r>
               <a:rPr lang="en-US" sz="2200" dirty="0" smtClean="0"/>
-              <a:t>El </a:t>
-            </a:r>
-            <a:r>
-              <a:rPr lang="en-US" sz="2200" b="1" dirty="0" err="1" smtClean="0"/>
-              <a:t>problema</a:t>
+              <a:t>The </a:t>
+            </a:r>
+            <a:r>
+              <a:rPr lang="en-US" sz="2200" b="1" dirty="0" smtClean="0"/>
+              <a:t>issue</a:t>
             </a:r>
             <a:r>
               <a:rPr lang="en-US" sz="2200" dirty="0" smtClean="0"/>
-              <a:t> al que </a:t>
-            </a:r>
-            <a:r>
-              <a:rPr lang="en-US" sz="2200" dirty="0" err="1" smtClean="0"/>
-              <a:t>nos</a:t>
-            </a:r>
-            <a:r>
-              <a:rPr lang="en-US" sz="2200" dirty="0" smtClean="0"/>
-              <a:t> </a:t>
-            </a:r>
-            <a:r>
-              <a:rPr lang="en-US" sz="2200" dirty="0" err="1" smtClean="0"/>
-              <a:t>enfrentamos</a:t>
-            </a:r>
-            <a:r>
-              <a:rPr lang="en-US" sz="2200" dirty="0" smtClean="0"/>
-              <a:t>:</a:t>
-            </a:r>
+              <a:t> we are facing:</a:t>
+            </a:r>
+            <a:endParaRPr lang="en-US" sz="2200" dirty="0" smtClean="0"/>
           </a:p>
           <a:p>
             <a:pPr lvl="1"/>
             <a:r>
-              <a:rPr lang="en-US" sz="2200" dirty="0" err="1" smtClean="0"/>
-              <a:t>Falta</a:t>
-            </a:r>
-            <a:r>
-              <a:rPr lang="en-US" sz="2200" dirty="0" smtClean="0"/>
-              <a:t> de </a:t>
-            </a:r>
-            <a:r>
-              <a:rPr lang="en-US" sz="2200" dirty="0" err="1" smtClean="0"/>
-              <a:t>información</a:t>
-            </a:r>
-            <a:r>
-              <a:rPr lang="en-US" sz="2200" dirty="0" smtClean="0"/>
-              <a:t> ante </a:t>
-            </a:r>
-            <a:r>
-              <a:rPr lang="en-US" sz="2200" dirty="0" err="1" smtClean="0"/>
-              <a:t>situaciones</a:t>
-            </a:r>
-            <a:r>
-              <a:rPr lang="en-US" sz="2200" dirty="0" smtClean="0"/>
-              <a:t> de </a:t>
-            </a:r>
-            <a:r>
-              <a:rPr lang="en-US" sz="2200" dirty="0" err="1" smtClean="0"/>
-              <a:t>emergencia</a:t>
-            </a:r>
-            <a:r>
-              <a:rPr lang="en-US" sz="2200" dirty="0" smtClean="0"/>
-              <a:t>.</a:t>
+              <a:rPr lang="en-US" sz="2200" dirty="0"/>
+              <a:t>Lack of information in emergency situations.</a:t>
             </a:r>
             <a:r>
               <a:rPr lang="en-US" sz="2200" dirty="0" smtClean="0"/>
@@ -14204,16 +14158,12 @@
           </a:p>
           <a:p>
             <a:r>
-              <a:rPr lang="en-US" sz="2200" dirty="0" err="1"/>
-              <a:t>Nuestra</a:t>
-            </a:r>
-            <a:r>
-              <a:rPr lang="en-US" sz="2200" dirty="0"/>
-              <a:t> </a:t>
-            </a:r>
-            <a:r>
-              <a:rPr lang="en-US" sz="2200" b="1" dirty="0" err="1" smtClean="0"/>
-              <a:t>solución</a:t>
+              <a:rPr lang="en-US" sz="2200" dirty="0" smtClean="0"/>
+              <a:t>Our </a:t>
+            </a:r>
+            <a:r>
+              <a:rPr lang="en-US" sz="2200" b="1" dirty="0" smtClean="0"/>
+              <a:t>solution</a:t>
             </a:r>
             <a:r>
               <a:rPr lang="en-US" sz="2200" dirty="0" smtClean="0"/>
@@ -14224,80 +14174,8 @@
           <a:p>
             <a:pPr lvl="1"/>
             <a:r>
-              <a:rPr lang="en-US" sz="2200" dirty="0" err="1" smtClean="0"/>
-              <a:t>Desarrollo</a:t>
-            </a:r>
-            <a:r>
               <a:rPr lang="en-US" sz="2200" dirty="0" smtClean="0"/>
-              <a:t> de </a:t>
-            </a:r>
-            <a:r>
-              <a:rPr lang="en-US" sz="2200" dirty="0" err="1" smtClean="0"/>
-              <a:t>una</a:t>
-            </a:r>
-            <a:r>
-              <a:rPr lang="en-US" sz="2200" dirty="0" smtClean="0"/>
-              <a:t> </a:t>
-            </a:r>
-            <a:r>
-              <a:rPr lang="en-US" sz="2200" dirty="0" err="1" smtClean="0"/>
-              <a:t>aplicación</a:t>
-            </a:r>
-            <a:r>
-              <a:rPr lang="en-US" sz="2200" dirty="0" smtClean="0"/>
-              <a:t> que </a:t>
-            </a:r>
-            <a:r>
-              <a:rPr lang="en-US" sz="2200" dirty="0" err="1" smtClean="0"/>
-              <a:t>ubica</a:t>
-            </a:r>
-            <a:r>
-              <a:rPr lang="en-US" sz="2200" dirty="0" smtClean="0"/>
-              <a:t> </a:t>
-            </a:r>
-            <a:r>
-              <a:rPr lang="en-US" sz="2200" dirty="0" err="1" smtClean="0"/>
-              <a:t>en</a:t>
-            </a:r>
-            <a:r>
-              <a:rPr lang="en-US" sz="2200" dirty="0" smtClean="0"/>
-              <a:t> </a:t>
-            </a:r>
-            <a:r>
-              <a:rPr lang="en-US" sz="2200" dirty="0" err="1" smtClean="0"/>
-              <a:t>tiempo</a:t>
-            </a:r>
-            <a:r>
-              <a:rPr lang="en-US" sz="2200" dirty="0"/>
-              <a:t> </a:t>
-            </a:r>
-            <a:r>
-              <a:rPr lang="en-US" sz="2200" dirty="0" smtClean="0"/>
-              <a:t>real a personas </a:t>
-            </a:r>
-            <a:r>
-              <a:rPr lang="en-US" sz="2200" dirty="0" err="1" smtClean="0"/>
-              <a:t>afectadas</a:t>
-            </a:r>
-            <a:r>
-              <a:rPr lang="en-US" sz="2200" dirty="0" smtClean="0"/>
-              <a:t> y </a:t>
-            </a:r>
-            <a:r>
-              <a:rPr lang="en-US" sz="2200" dirty="0" smtClean="0"/>
-              <a:t>zonas </a:t>
-            </a:r>
-            <a:r>
-              <a:rPr lang="en-US" sz="2200" dirty="0" smtClean="0"/>
-              <a:t>de </a:t>
-            </a:r>
-            <a:r>
-              <a:rPr lang="en-US" sz="2200" dirty="0" err="1" smtClean="0"/>
-              <a:t>riesgo</a:t>
-            </a:r>
-            <a:r>
-              <a:rPr lang="en-US" sz="2200" dirty="0" smtClean="0"/>
-              <a:t>.</a:t>
+              <a:t>Develop an application which finds in real time people in danger and hazardous areas</a:t>
             </a:r>
             <a:endParaRPr lang="en-US" sz="2400" dirty="0"/>
           </a:p>
@@ -14497,28 +14375,8 @@
           <a:p>
             <a:pPr algn="ctr"/>
             <a:r>
-              <a:rPr lang="en-US" dirty="0" err="1" smtClean="0"/>
-              <a:t>Área</a:t>
-            </a:r>
-            <a:r>
               <a:rPr lang="en-US" dirty="0" smtClean="0"/>
-              <a:t> </a:t>
-            </a:r>
-            <a:r>
-              <a:rPr lang="en-US" dirty="0" err="1" smtClean="0"/>
-              <a:t>en</a:t>
-            </a:r>
-            <a:r>
-              <a:rPr lang="en-US" dirty="0" smtClean="0"/>
-              <a:t> </a:t>
-            </a:r>
-            <a:r>
-              <a:rPr lang="en-US" dirty="0" err="1" smtClean="0"/>
-              <a:t>peligro</a:t>
-            </a:r>
-            <a:r>
-              <a:rPr lang="en-US" dirty="0" smtClean="0"/>
-              <a:t> </a:t>
+              <a:t>Hazard area</a:t>
             </a:r>
             <a:endParaRPr lang="en-US" dirty="0"/>
           </a:p>
@@ -15007,8 +14865,8 @@
         </p:nvSpPr>
         <p:spPr>
           <a:xfrm>
-            <a:off x="941833" y="973668"/>
-            <a:ext cx="9226296" cy="706964"/>
+            <a:off x="941832" y="973668"/>
+            <a:ext cx="9500615" cy="706964"/>
           </a:xfrm>
         </p:spPr>
         <p:txBody>
@@ -15016,10 +14874,38 @@
           <a:lstStyle/>
           <a:p>
             <a:r>
-              <a:rPr lang="es-ES" dirty="0" smtClean="0"/>
-              <a:t>Safety Network: información de usuarios</a:t>
-            </a:r>
-            <a:endParaRPr lang="es-ES" dirty="0"/>
+              <a:rPr lang="es-ES" sz="3200" dirty="0" smtClean="0"/>
+              <a:t>Safety Network: </a:t>
+            </a:r>
+            <a:r>
+              <a:rPr lang="es-ES" sz="3200" dirty="0" err="1" smtClean="0"/>
+              <a:t>information</a:t>
+            </a:r>
+            <a:r>
+              <a:rPr lang="es-ES" sz="3200" dirty="0" smtClean="0"/>
+              <a:t> </a:t>
+            </a:r>
+            <a:r>
+              <a:rPr lang="es-ES" sz="3200" dirty="0" err="1" smtClean="0"/>
+              <a:t>coming</a:t>
+            </a:r>
+            <a:r>
+              <a:rPr lang="es-ES" sz="3200" dirty="0" smtClean="0"/>
+              <a:t> </a:t>
+            </a:r>
+            <a:r>
+              <a:rPr lang="es-ES" sz="3200" dirty="0" err="1" smtClean="0"/>
+              <a:t>from</a:t>
+            </a:r>
+            <a:r>
+              <a:rPr lang="es-ES" sz="3200" dirty="0" smtClean="0"/>
+              <a:t> </a:t>
+            </a:r>
+            <a:r>
+              <a:rPr lang="es-ES" sz="3200" dirty="0" err="1" smtClean="0"/>
+              <a:t>users</a:t>
+            </a:r>
+            <a:endParaRPr lang="es-ES" sz="3200" dirty="0"/>
           </a:p>
         </p:txBody>
       </p:sp>
@@ -15734,8 +15620,8 @@
           <a:p>
             <a:pPr algn="ctr"/>
             <a:r>
-              <a:rPr lang="es-ES" dirty="0" smtClean="0"/>
-              <a:t>Área en peligro</a:t>
+              <a:rPr lang="en-US" dirty="0" smtClean="0"/>
+              <a:t>Hazard area</a:t>
             </a:r>
             <a:endParaRPr lang="en-US" dirty="0"/>
           </a:p>
@@ -15898,8 +15784,16 @@
           <a:p>
             <a:pPr algn="ctr"/>
             <a:r>
+              <a:rPr lang="es-ES" dirty="0" err="1" smtClean="0"/>
+              <a:t>Hazard</a:t>
+            </a:r>
+            <a:r>
               <a:rPr lang="es-ES" dirty="0" smtClean="0"/>
-              <a:t>Área en peligro</a:t>
+              <a:t> </a:t>
+            </a:r>
+            <a:r>
+              <a:rPr lang="es-ES" dirty="0" err="1" smtClean="0"/>
+              <a:t>area</a:t>
             </a:r>
             <a:endParaRPr lang="en-US" dirty="0"/>
           </a:p>
@@ -16037,8 +15931,8 @@
         </p:nvSpPr>
         <p:spPr>
           <a:xfrm>
-            <a:off x="941833" y="973668"/>
-            <a:ext cx="9226296" cy="706964"/>
+            <a:off x="941832" y="973668"/>
+            <a:ext cx="9784079" cy="706964"/>
           </a:xfrm>
         </p:spPr>
         <p:txBody>
@@ -16046,10 +15940,38 @@
           <a:lstStyle/>
           <a:p>
             <a:r>
-              <a:rPr lang="es-ES" dirty="0" smtClean="0"/>
-              <a:t>Safety Network: información de usuarios</a:t>
-            </a:r>
-            <a:endParaRPr lang="es-ES" dirty="0"/>
+              <a:rPr lang="es-ES" sz="3200" dirty="0"/>
+              <a:t>Safety Network: </a:t>
+            </a:r>
+            <a:r>
+              <a:rPr lang="es-ES" sz="3200" dirty="0" err="1"/>
+              <a:t>information</a:t>
+            </a:r>
+            <a:r>
+              <a:rPr lang="es-ES" sz="3200" dirty="0"/>
+              <a:t> </a:t>
+            </a:r>
+            <a:r>
+              <a:rPr lang="es-ES" sz="3200" dirty="0" err="1"/>
+              <a:t>coming</a:t>
+            </a:r>
+            <a:r>
+              <a:rPr lang="es-ES" sz="3200" dirty="0"/>
+              <a:t> </a:t>
+            </a:r>
+            <a:r>
+              <a:rPr lang="es-ES" sz="3200" dirty="0" err="1"/>
+              <a:t>from</a:t>
+            </a:r>
+            <a:r>
+              <a:rPr lang="es-ES" sz="3200" dirty="0"/>
+              <a:t> </a:t>
+            </a:r>
+            <a:r>
+              <a:rPr lang="es-ES" sz="3200" dirty="0" err="1"/>
+              <a:t>users</a:t>
+            </a:r>
+            <a:endParaRPr lang="es-ES" sz="3200" dirty="0"/>
           </a:p>
         </p:txBody>
       </p:sp>
@@ -17148,10 +17070,30 @@
           <a:lstStyle/>
           <a:p>
             <a:r>
-              <a:rPr lang="es-ES" dirty="0" smtClean="0"/>
-              <a:t>Safety Network: ejemplo de propagación</a:t>
-            </a:r>
-            <a:endParaRPr lang="es-ES" dirty="0"/>
+              <a:rPr lang="es-ES" sz="3200" dirty="0" smtClean="0"/>
+              <a:t>Safety Network: </a:t>
+            </a:r>
+            <a:r>
+              <a:rPr lang="es-ES" sz="3200" dirty="0" err="1" smtClean="0"/>
+              <a:t>example</a:t>
+            </a:r>
+            <a:r>
+              <a:rPr lang="es-ES" sz="3200" dirty="0" smtClean="0"/>
+              <a:t> of </a:t>
+            </a:r>
+            <a:r>
+              <a:rPr lang="es-ES" sz="3200" dirty="0" err="1" smtClean="0"/>
+              <a:t>alert</a:t>
+            </a:r>
+            <a:r>
+              <a:rPr lang="es-ES" sz="3200" dirty="0" smtClean="0"/>
+              <a:t> </a:t>
+            </a:r>
+            <a:r>
+              <a:rPr lang="es-ES" sz="3200" dirty="0" err="1" smtClean="0"/>
+              <a:t>propagation</a:t>
+            </a:r>
+            <a:endParaRPr lang="es-ES" sz="3200" dirty="0"/>
           </a:p>
         </p:txBody>
       </p:sp>
@@ -17875,8 +17817,16 @@
               <a:t>Safety Network: </a:t>
             </a:r>
             <a:r>
+              <a:rPr lang="es-ES" dirty="0" err="1" smtClean="0"/>
+              <a:t>our</a:t>
+            </a:r>
+            <a:r>
               <a:rPr lang="es-ES" dirty="0" smtClean="0"/>
-              <a:t>aplicación móvil</a:t>
+              <a:t> </a:t>
+            </a:r>
+            <a:r>
+              <a:rPr lang="es-ES" dirty="0" err="1" smtClean="0"/>
+              <a:t>application</a:t>
             </a:r>
             <a:endParaRPr lang="de-DE" dirty="0"/>
           </a:p>
@@ -18109,8 +18059,16 @@
           <a:p>
             <a:pPr algn="ctr"/>
             <a:r>
+              <a:rPr lang="es-ES" dirty="0" err="1" smtClean="0"/>
+              <a:t>Hazard</a:t>
+            </a:r>
+            <a:r>
               <a:rPr lang="es-ES" dirty="0" smtClean="0"/>
-              <a:t>Área en peligro</a:t>
+              <a:t> </a:t>
+            </a:r>
+            <a:r>
+              <a:rPr lang="es-ES" dirty="0" err="1" smtClean="0"/>
+              <a:t>area</a:t>
             </a:r>
             <a:endParaRPr lang="en-US" dirty="0"/>
           </a:p>
@@ -18133,10 +18091,86 @@
           <a:p>
             <a:pPr algn="ctr"/>
             <a:r>
-              <a:rPr lang="es-ES" dirty="0" smtClean="0"/>
-              <a:t>Safety Network: información desde servicios de emergencia</a:t>
-            </a:r>
-            <a:endParaRPr lang="es-ES" dirty="0"/>
+              <a:rPr lang="es-ES" sz="2800" dirty="0" smtClean="0"/>
+              <a:t>Safety Network: </a:t>
+            </a:r>
+            <a:r>
+              <a:rPr lang="es-ES" sz="2800" dirty="0" err="1" smtClean="0"/>
+              <a:t>information</a:t>
+            </a:r>
+            <a:r>
+              <a:rPr lang="es-ES" sz="2800" dirty="0" smtClean="0"/>
+              <a:t> </a:t>
+            </a:r>
+            <a:r>
+              <a:rPr lang="es-ES" sz="2800" dirty="0" err="1" smtClean="0"/>
+              <a:t>getting</a:t>
+            </a:r>
+            <a:r>
+              <a:rPr lang="es-ES" sz="2800" dirty="0" smtClean="0"/>
+              <a:t> </a:t>
+            </a:r>
+            <a:r>
+              <a:rPr lang="es-ES" sz="2800" dirty="0" err="1" smtClean="0"/>
+              <a:t>into</a:t>
+            </a:r>
+            <a:r>
+              <a:rPr lang="es-ES" sz="2800" dirty="0" smtClean="0"/>
+              <a:t> </a:t>
+            </a:r>
+            <a:r>
+              <a:rPr lang="es-ES" sz="2800" dirty="0" err="1" smtClean="0"/>
+              <a:t>the</a:t>
+            </a:r>
+            <a:r>
+              <a:rPr lang="es-ES" sz="2800" dirty="0" smtClean="0"/>
+              <a:t> </a:t>
+            </a:r>
+            <a:r>
+              <a:rPr lang="es-ES" sz="2800" dirty="0" err="1" smtClean="0"/>
+              <a:t>system</a:t>
+            </a:r>
+            <a:r>
+              <a:rPr lang="es-ES" sz="2800" dirty="0" smtClean="0"/>
+              <a:t> </a:t>
+            </a:r>
+            <a:r>
+              <a:rPr lang="es-ES" sz="2800" dirty="0" err="1" smtClean="0"/>
+              <a:t>from</a:t>
+            </a:r>
+            <a:r>
+              <a:rPr lang="es-ES" sz="2800" dirty="0" smtClean="0"/>
+              <a:t> </a:t>
+            </a:r>
+            <a:r>
+              <a:rPr lang="es-ES" sz="2800" dirty="0" err="1" smtClean="0"/>
+              <a:t>national</a:t>
+            </a:r>
+            <a:r>
+              <a:rPr lang="es-ES" sz="2800" dirty="0" smtClean="0"/>
+              <a:t> </a:t>
+            </a:r>
+            <a:r>
+              <a:rPr lang="es-ES" sz="2800" dirty="0" err="1" smtClean="0"/>
+              <a:t>emergency</a:t>
+            </a:r>
+            <a:r>
+              <a:rPr lang="es-ES" sz="2800" dirty="0" smtClean="0"/>
+              <a:t> </a:t>
+            </a:r>
+            <a:r>
+              <a:rPr lang="es-ES" sz="2800" dirty="0" err="1" smtClean="0"/>
+              <a:t>services</a:t>
+            </a:r>
+            <a:r>
+              <a:rPr lang="es-ES" sz="2800" dirty="0" smtClean="0"/>
+              <a:t> </a:t>
+            </a:r>
+            <a:r>
+              <a:rPr lang="es-ES" sz="2800" dirty="0" err="1" smtClean="0"/>
+              <a:t>APIs</a:t>
+            </a:r>
+            <a:endParaRPr lang="es-ES" sz="2800" dirty="0"/>
           </a:p>
         </p:txBody>
       </p:sp>
@@ -18758,16 +18792,24 @@
           <a:p>
             <a:pPr algn="ctr"/>
             <a:r>
+              <a:rPr lang="es-ES" dirty="0" err="1" smtClean="0"/>
+              <a:t>Possible</a:t>
+            </a:r>
+            <a:r>
               <a:rPr lang="es-ES" dirty="0" smtClean="0"/>
-              <a:t>Posible </a:t>
+              <a:t> </a:t>
+            </a:r>
+            <a:r>
+              <a:rPr lang="es-ES" dirty="0" err="1" smtClean="0"/>
+              <a:t>hazard</a:t>
             </a:r>
             <a:r>
               <a:rPr lang="es-ES" dirty="0" smtClean="0"/>
-              <a:t>área </a:t>
-            </a:r>
-            <a:r>
-              <a:rPr lang="es-ES" dirty="0" smtClean="0"/>
-              <a:t>en peligro</a:t>
+              <a:t> </a:t>
+            </a:r>
+            <a:r>
+              <a:rPr lang="es-ES" dirty="0" err="1" smtClean="0"/>
+              <a:t>area</a:t>
             </a:r>
             <a:endParaRPr lang="en-US" dirty="0"/>
           </a:p>
@@ -18790,7 +18832,15 @@
           <a:p>
             <a:r>
               <a:rPr lang="es-ES" dirty="0" smtClean="0"/>
-              <a:t>Safety Network: red neuronal</a:t>
+              <a:t>Safety Network: </a:t>
+            </a:r>
+            <a:r>
+              <a:rPr lang="es-ES" dirty="0" smtClean="0"/>
+              <a:t>neuronal </a:t>
+            </a:r>
+            <a:r>
+              <a:rPr lang="es-ES" dirty="0" err="1" smtClean="0"/>
+              <a:t>network</a:t>
             </a:r>
             <a:endParaRPr lang="es-ES" dirty="0"/>
           </a:p>
@@ -19173,7 +19223,15 @@
             <a:pPr algn="ctr"/>
             <a:r>
               <a:rPr lang="es-ES" sz="1050" dirty="0" smtClean="0"/>
-              <a:t>Red neuronal en </a:t>
+              <a:t>Neuronal </a:t>
+            </a:r>
+            <a:r>
+              <a:rPr lang="es-ES" sz="1050" dirty="0" err="1" smtClean="0"/>
+              <a:t>network</a:t>
+            </a:r>
+            <a:r>
+              <a:rPr lang="es-ES" sz="1050" dirty="0" smtClean="0"/>
+              <a:t> in </a:t>
             </a:r>
             <a:r>
               <a:rPr lang="es-ES" sz="1050" dirty="0" err="1" smtClean="0"/>
@@ -19220,12 +19278,20 @@
           <a:p>
             <a:pPr algn="ctr"/>
             <a:r>
+              <a:rPr lang="es-ES" sz="1050" dirty="0" err="1" smtClean="0"/>
+              <a:t>Previous</a:t>
+            </a:r>
+            <a:r>
               <a:rPr lang="es-ES" sz="1050" dirty="0" smtClean="0"/>
-              <a:t>Histórico de </a:t>
+              <a:t> </a:t>
+            </a:r>
+            <a:r>
+              <a:rPr lang="es-ES" sz="1050" dirty="0" err="1" smtClean="0"/>
+              <a:t>alerts</a:t>
             </a:r>
             <a:r>
               <a:rPr lang="es-ES" sz="1050" dirty="0" smtClean="0"/>
-              <a:t>alertas</a:t>
+              <a:t> records</a:t>
             </a:r>
             <a:endParaRPr lang="es-ES" sz="1050" dirty="0"/>
           </a:p>
@@ -19480,7 +19546,23 @@
           <a:p>
             <a:r>
               <a:rPr lang="es-ES" dirty="0" smtClean="0"/>
-              <a:t>Safety Network: API servicios</a:t>
+              <a:t>Safety Network: </a:t>
+            </a:r>
+            <a:r>
+              <a:rPr lang="es-ES" dirty="0" err="1" smtClean="0"/>
+              <a:t>External</a:t>
+            </a:r>
+            <a:r>
+              <a:rPr lang="es-ES" dirty="0" smtClean="0"/>
+              <a:t> </a:t>
+            </a:r>
+            <a:r>
+              <a:rPr lang="es-ES" dirty="0" err="1" smtClean="0"/>
+              <a:t>generic</a:t>
+            </a:r>
+            <a:r>
+              <a:rPr lang="es-ES" dirty="0" smtClean="0"/>
+              <a:t> API</a:t>
             </a:r>
             <a:endParaRPr lang="es-ES" dirty="0"/>
           </a:p>
@@ -19502,36 +19584,140 @@
           <a:lstStyle/>
           <a:p>
             <a:r>
+              <a:rPr lang="es-ES" dirty="0" err="1" smtClean="0"/>
+              <a:t>Our</a:t>
+            </a:r>
+            <a:r>
               <a:rPr lang="es-ES" dirty="0" smtClean="0"/>
-              <a:t>El sistema también cuenta con </a:t>
+              <a:t> </a:t>
+            </a:r>
+            <a:r>
+              <a:rPr lang="es-ES" dirty="0" err="1" smtClean="0"/>
+              <a:t>system</a:t>
+            </a:r>
+            <a:r>
+              <a:rPr lang="es-ES" dirty="0"/>
+              <a:t> </a:t>
             </a:r>
             <a:r>
               <a:rPr lang="es-ES" dirty="0" smtClean="0"/>
-              <a:t>accesos de </a:t>
+              <a:t>has </a:t>
+            </a:r>
+            <a:r>
+              <a:rPr lang="es-ES" dirty="0" err="1" smtClean="0"/>
+              <a:t>the</a:t>
             </a:r>
             <a:r>
               <a:rPr lang="es-ES" dirty="0" smtClean="0"/>
-              <a:t>lectura/escritura de alertas para integrarlo con cualquier otro sistema:</a:t>
-            </a:r>
+              <a:t> </a:t>
+            </a:r>
+            <a:r>
+              <a:rPr lang="es-ES" dirty="0" err="1" smtClean="0"/>
+              <a:t>possibility</a:t>
+            </a:r>
+            <a:r>
+              <a:rPr lang="es-ES" dirty="0" smtClean="0"/>
+              <a:t> of </a:t>
+            </a:r>
+            <a:r>
+              <a:rPr lang="es-ES" dirty="0" err="1" smtClean="0"/>
+              <a:t>external</a:t>
+            </a:r>
+            <a:r>
+              <a:rPr lang="es-ES" dirty="0" smtClean="0"/>
+              <a:t> Reading/</a:t>
+            </a:r>
+            <a:r>
+              <a:rPr lang="es-ES" dirty="0" err="1" smtClean="0"/>
+              <a:t>writing</a:t>
+            </a:r>
+            <a:r>
+              <a:rPr lang="es-ES" dirty="0" smtClean="0"/>
+              <a:t> of </a:t>
+            </a:r>
+            <a:r>
+              <a:rPr lang="es-ES" dirty="0" err="1" smtClean="0"/>
+              <a:t>alerts</a:t>
+            </a:r>
+            <a:r>
+              <a:rPr lang="es-ES" dirty="0" smtClean="0"/>
+              <a:t> so </a:t>
+            </a:r>
+            <a:r>
+              <a:rPr lang="es-ES" dirty="0" err="1" smtClean="0"/>
+              <a:t>that</a:t>
+            </a:r>
+            <a:r>
+              <a:rPr lang="es-ES" dirty="0" smtClean="0"/>
+              <a:t> </a:t>
+            </a:r>
+            <a:r>
+              <a:rPr lang="es-ES" dirty="0" err="1" smtClean="0"/>
+              <a:t>any</a:t>
+            </a:r>
+            <a:r>
+              <a:rPr lang="es-ES" dirty="0" smtClean="0"/>
+              <a:t> </a:t>
+            </a:r>
+            <a:r>
+              <a:rPr lang="es-ES" dirty="0" err="1" smtClean="0"/>
+              <a:t>other</a:t>
+            </a:r>
+            <a:r>
+              <a:rPr lang="es-ES" dirty="0" smtClean="0"/>
+              <a:t> </a:t>
+            </a:r>
+            <a:r>
+              <a:rPr lang="es-ES" dirty="0" err="1" smtClean="0"/>
+              <a:t>system</a:t>
+            </a:r>
+            <a:r>
+              <a:rPr lang="es-ES" dirty="0" smtClean="0"/>
+              <a:t> can be </a:t>
+            </a:r>
+            <a:r>
+              <a:rPr lang="es-ES" dirty="0" err="1" smtClean="0"/>
+              <a:t>integrated</a:t>
+            </a:r>
+            <a:r>
+              <a:rPr lang="es-ES" dirty="0" smtClean="0"/>
+              <a:t> </a:t>
+            </a:r>
+            <a:r>
+              <a:rPr lang="es-ES" dirty="0" err="1" smtClean="0"/>
+              <a:t>with</a:t>
+            </a:r>
+            <a:r>
+              <a:rPr lang="es-ES" dirty="0" smtClean="0"/>
+              <a:t> </a:t>
+            </a:r>
+            <a:r>
+              <a:rPr lang="es-ES" dirty="0" err="1" smtClean="0"/>
+              <a:t>us</a:t>
+            </a:r>
+            <a:r>
+              <a:rPr lang="es-ES" dirty="0" smtClean="0"/>
+              <a:t>:</a:t>
+            </a:r>
+            <a:endParaRPr lang="es-ES" dirty="0" smtClean="0"/>
           </a:p>
           <a:p>
             <a:pPr lvl="1"/>
             <a:r>
               <a:rPr lang="es-ES" dirty="0" smtClean="0"/>
-              <a:t>http://</a:t>
-            </a:r>
+              <a:t>http://BASE_URL/api/alerts/FireAlert</a:t>
+            </a:r>
+          </a:p>
+          <a:p>
+            <a:pPr lvl="1"/>
             <a:r>
               <a:rPr lang="es-ES" dirty="0" smtClean="0"/>
-              <a:t>BASE_URL/api/alerts/FireAlert</a:t>
-            </a:r>
-          </a:p>
-          <a:p>
-            <a:pPr lvl="1"/>
+              <a:t>http</a:t>
+            </a:r>
             <a:r>
               <a:rPr lang="es-ES" dirty="0" smtClean="0"/>
-              <a:t>http://BASE_URL/api/alerts/FloodAlert?latitude38,006480&amp;longitude=-1,145728</a:t>
-            </a:r>
-            <a:endParaRPr lang="es-ES" dirty="0" smtClean="0"/>
+              <a:t>://BASE_URL/api/alerts/FloodAlert?latitude38,006480&amp;longitude=-1,145728</a:t>
+            </a:r>
           </a:p>
         </p:txBody>
       </p:sp>
@@ -19821,21 +20007,6 @@
 </file>
 
 <file path=customXml/item1.xml><?xml version="1.0" encoding="utf-8"?>
-<?mso-contentType ?>
-<FormTemplates xmlns="http://schemas.microsoft.com/sharepoint/v3/contenttype/forms">
-  <Display>DocumentLibraryForm</Display>
-  <Edit>DocumentLibraryForm</Edit>
-  <New>DocumentLibraryForm</New>
-</FormTemplates>
-</file>
-
-<file path=customXml/item2.xml><?xml version="1.0" encoding="utf-8"?>
-<p:properties xmlns:p="http://schemas.microsoft.com/office/2006/metadata/properties" xmlns:xsi="http://www.w3.org/2001/XMLSchema-instance" xmlns:pc="http://schemas.microsoft.com/office/infopath/2007/PartnerControls">
-  <documentManagement/>
-</p:properties>
-</file>
-
-<file path=customXml/item3.xml><?xml version="1.0" encoding="utf-8"?>
 <ct:contentTypeSchema xmlns:ct="http://schemas.microsoft.com/office/2006/metadata/contentType" xmlns:ma="http://schemas.microsoft.com/office/2006/metadata/properties/metaAttributes" ct:_="" ma:_="" ma:contentTypeName="Documento" ma:contentTypeID="0x010100E3FD2FFA77482745B6FBB0D12C664289" ma:contentTypeVersion="2" ma:contentTypeDescription="Crear nuevo documento." ma:contentTypeScope="" ma:versionID="230209e1f19c8dabcbde64a66cd42759">
   <xsd:schema xmlns:xsd="http://www.w3.org/2001/XMLSchema" xmlns:xs="http://www.w3.org/2001/XMLSchema" xmlns:p="http://schemas.microsoft.com/office/2006/metadata/properties" xmlns:ns2="0e23858f-3dcf-44e3-9897-9cfaf4025768" targetNamespace="http://schemas.microsoft.com/office/2006/metadata/properties" ma:root="true" ma:fieldsID="42966af423c5044f6c0d5a97827c01c9" ns2:_="">
     <xsd:import namespace="0e23858f-3dcf-44e3-9897-9cfaf4025768"/>
@@ -19967,10 +20138,35 @@
 </ct:contentTypeSchema>
 </file>
 
+<file path=customXml/item2.xml><?xml version="1.0" encoding="utf-8"?>
+<p:properties xmlns:p="http://schemas.microsoft.com/office/2006/metadata/properties" xmlns:xsi="http://www.w3.org/2001/XMLSchema-instance" xmlns:pc="http://schemas.microsoft.com/office/infopath/2007/PartnerControls">
+  <documentManagement/>
+</p:properties>
+</file>
+
+<file path=customXml/item3.xml><?xml version="1.0" encoding="utf-8"?>
+<?mso-contentType ?>
+<FormTemplates xmlns="http://schemas.microsoft.com/sharepoint/v3/contenttype/forms">
+  <Display>DocumentLibraryForm</Display>
+  <Edit>DocumentLibraryForm</Edit>
+  <New>DocumentLibraryForm</New>
+</FormTemplates>
+</file>
+
 <file path=customXml/itemProps1.xml><?xml version="1.0" encoding="utf-8"?>
-<ds:datastoreItem xmlns:ds="http://schemas.openxmlformats.org/officeDocument/2006/customXml" ds:itemID="{AFA05530-0BA0-4DF2-8D28-826EE07CF1E1}">
+<ds:datastoreItem xmlns:ds="http://schemas.openxmlformats.org/officeDocument/2006/customXml" ds:itemID="{1F0583A3-A68A-45E6-9C61-04A6E758B3D3}">
   <ds:schemaRefs>
-    <ds:schemaRef ds:uri="http://schemas.microsoft.com/sharepoint/v3/contenttype/forms"/>
+    <ds:schemaRef ds:uri="http://schemas.microsoft.com/office/2006/metadata/contentType"/>
+    <ds:schemaRef ds:uri="http://schemas.microsoft.com/office/2006/metadata/properties/metaAttributes"/>
+    <ds:schemaRef ds:uri="http://www.w3.org/2001/XMLSchema"/>
+    <ds:schemaRef ds:uri="http://schemas.microsoft.com/office/2006/metadata/properties"/>
+    <ds:schemaRef ds:uri="0e23858f-3dcf-44e3-9897-9cfaf4025768"/>
+    <ds:schemaRef ds:uri="http://schemas.microsoft.com/office/2006/documentManagement/types"/>
+    <ds:schemaRef ds:uri="http://schemas.microsoft.com/office/infopath/2007/PartnerControls"/>
+    <ds:schemaRef ds:uri="http://schemas.openxmlformats.org/package/2006/metadata/core-properties"/>
+    <ds:schemaRef ds:uri="http://purl.org/dc/elements/1.1/"/>
+    <ds:schemaRef ds:uri="http://purl.org/dc/terms/"/>
+    <ds:schemaRef ds:uri="http://schemas.microsoft.com/internal/obd"/>
   </ds:schemaRefs>
 </ds:datastoreItem>
 </file>
@@ -19992,19 +20188,9 @@
 </file>
 
 <file path=customXml/itemProps3.xml><?xml version="1.0" encoding="utf-8"?>
-<ds:datastoreItem xmlns:ds="http://schemas.openxmlformats.org/officeDocument/2006/customXml" ds:itemID="{1F0583A3-A68A-45E6-9C61-04A6E758B3D3}">
+<ds:datastoreItem xmlns:ds="http://schemas.openxmlformats.org/officeDocument/2006/customXml" ds:itemID="{AFA05530-0BA0-4DF2-8D28-826EE07CF1E1}">
   <ds:schemaRefs>
-    <ds:schemaRef ds:uri="http://schemas.microsoft.com/office/2006/metadata/contentType"/>
-    <ds:schemaRef ds:uri="http://schemas.microsoft.com/office/2006/metadata/properties/metaAttributes"/>
-    <ds:schemaRef ds:uri="http://www.w3.org/2001/XMLSchema"/>
-    <ds:schemaRef ds:uri="http://schemas.microsoft.com/office/2006/metadata/properties"/>
-    <ds:schemaRef ds:uri="0e23858f-3dcf-44e3-9897-9cfaf4025768"/>
-    <ds:schemaRef ds:uri="http://schemas.microsoft.com/office/2006/documentManagement/types"/>
-    <ds:schemaRef ds:uri="http://schemas.microsoft.com/office/infopath/2007/PartnerControls"/>
-    <ds:schemaRef ds:uri="http://schemas.openxmlformats.org/package/2006/metadata/core-properties"/>
-    <ds:schemaRef ds:uri="http://purl.org/dc/elements/1.1/"/>
-    <ds:schemaRef ds:uri="http://purl.org/dc/terms/"/>
-    <ds:schemaRef ds:uri="http://schemas.microsoft.com/internal/obd"/>
+    <ds:schemaRef ds:uri="http://schemas.microsoft.com/sharepoint/v3/contenttype/forms"/>
   </ds:schemaRefs>
 </ds:datastoreItem>
 </file>
</xml_diff>